<commit_message>
Added termination detection video
</commit_message>
<xml_diff>
--- a/GlobalSnapshotApplications/GlobalSnapshotApplications_Figures.pptx
+++ b/GlobalSnapshotApplications/GlobalSnapshotApplications_Figures.pptx
@@ -4,6 +4,9 @@
   <p:sldMasterIdLst>
     <p:sldMasterId id="2147483648" r:id="rId1"/>
   </p:sldMasterIdLst>
+  <p:notesMasterIdLst>
+    <p:notesMasterId r:id="rId14"/>
+  </p:notesMasterIdLst>
   <p:sldIdLst>
     <p:sldId id="256" r:id="rId2"/>
     <p:sldId id="257" r:id="rId3"/>
@@ -16,6 +19,7 @@
     <p:sldId id="269" r:id="rId10"/>
     <p:sldId id="260" r:id="rId11"/>
     <p:sldId id="262" r:id="rId12"/>
+    <p:sldId id="270" r:id="rId13"/>
   </p:sldIdLst>
   <p:sldSz cx="9144000" cy="6858000" type="screen4x3"/>
   <p:notesSz cx="6858000" cy="9144000"/>
@@ -117,6 +121,440 @@
 </p:presentation>
 </file>
 
+<file path=ppt/notesMasters/notesMaster1.xml><?xml version="1.0" encoding="utf-8"?>
+<p:notesMaster xmlns:a="http://schemas.openxmlformats.org/drawingml/2006/main" xmlns:r="http://schemas.openxmlformats.org/officeDocument/2006/relationships" xmlns:p="http://schemas.openxmlformats.org/presentationml/2006/main">
+  <p:cSld>
+    <p:bg>
+      <p:bgRef idx="1001">
+        <a:schemeClr val="bg1"/>
+      </p:bgRef>
+    </p:bg>
+    <p:spTree>
+      <p:nvGrpSpPr>
+        <p:cNvPr id="1" name=""/>
+        <p:cNvGrpSpPr/>
+        <p:nvPr/>
+      </p:nvGrpSpPr>
+      <p:grpSpPr>
+        <a:xfrm>
+          <a:off x="0" y="0"/>
+          <a:ext cx="0" cy="0"/>
+          <a:chOff x="0" y="0"/>
+          <a:chExt cx="0" cy="0"/>
+        </a:xfrm>
+      </p:grpSpPr>
+      <p:sp>
+        <p:nvSpPr>
+          <p:cNvPr id="2" name="Header Placeholder 1"/>
+          <p:cNvSpPr>
+            <a:spLocks noGrp="1"/>
+          </p:cNvSpPr>
+          <p:nvPr>
+            <p:ph type="hdr" sz="quarter"/>
+          </p:nvPr>
+        </p:nvSpPr>
+        <p:spPr>
+          <a:xfrm>
+            <a:off x="0" y="0"/>
+            <a:ext cx="2971800" cy="457200"/>
+          </a:xfrm>
+          <a:prstGeom prst="rect">
+            <a:avLst/>
+          </a:prstGeom>
+        </p:spPr>
+        <p:txBody>
+          <a:bodyPr vert="horz" lIns="91440" tIns="45720" rIns="91440" bIns="45720" rtlCol="0"/>
+          <a:lstStyle>
+            <a:lvl1pPr algn="l">
+              <a:defRPr sz="1200"/>
+            </a:lvl1pPr>
+          </a:lstStyle>
+          <a:p>
+            <a:endParaRPr lang="en-US"/>
+          </a:p>
+        </p:txBody>
+      </p:sp>
+      <p:sp>
+        <p:nvSpPr>
+          <p:cNvPr id="3" name="Date Placeholder 2"/>
+          <p:cNvSpPr>
+            <a:spLocks noGrp="1"/>
+          </p:cNvSpPr>
+          <p:nvPr>
+            <p:ph type="dt" idx="1"/>
+          </p:nvPr>
+        </p:nvSpPr>
+        <p:spPr>
+          <a:xfrm>
+            <a:off x="3884613" y="0"/>
+            <a:ext cx="2971800" cy="457200"/>
+          </a:xfrm>
+          <a:prstGeom prst="rect">
+            <a:avLst/>
+          </a:prstGeom>
+        </p:spPr>
+        <p:txBody>
+          <a:bodyPr vert="horz" lIns="91440" tIns="45720" rIns="91440" bIns="45720" rtlCol="0"/>
+          <a:lstStyle>
+            <a:lvl1pPr algn="r">
+              <a:defRPr sz="1200"/>
+            </a:lvl1pPr>
+          </a:lstStyle>
+          <a:p>
+            <a:fld id="{C1ED37A7-6C9F-2B43-857F-F6E30D6CCE1D}" type="datetimeFigureOut">
+              <a:rPr lang="en-US" smtClean="0"/>
+              <a:t>9/30/21</a:t>
+            </a:fld>
+            <a:endParaRPr lang="en-US"/>
+          </a:p>
+        </p:txBody>
+      </p:sp>
+      <p:sp>
+        <p:nvSpPr>
+          <p:cNvPr id="4" name="Slide Image Placeholder 3"/>
+          <p:cNvSpPr>
+            <a:spLocks noGrp="1" noRot="1" noChangeAspect="1"/>
+          </p:cNvSpPr>
+          <p:nvPr>
+            <p:ph type="sldImg" idx="2"/>
+          </p:nvPr>
+        </p:nvSpPr>
+        <p:spPr>
+          <a:xfrm>
+            <a:off x="1143000" y="685800"/>
+            <a:ext cx="4572000" cy="3429000"/>
+          </a:xfrm>
+          <a:prstGeom prst="rect">
+            <a:avLst/>
+          </a:prstGeom>
+          <a:noFill/>
+          <a:ln w="12700">
+            <a:solidFill>
+              <a:prstClr val="black"/>
+            </a:solidFill>
+          </a:ln>
+        </p:spPr>
+        <p:txBody>
+          <a:bodyPr vert="horz" lIns="91440" tIns="45720" rIns="91440" bIns="45720" rtlCol="0" anchor="ctr"/>
+          <a:lstStyle/>
+          <a:p>
+            <a:endParaRPr lang="en-US"/>
+          </a:p>
+        </p:txBody>
+      </p:sp>
+      <p:sp>
+        <p:nvSpPr>
+          <p:cNvPr id="5" name="Notes Placeholder 4"/>
+          <p:cNvSpPr>
+            <a:spLocks noGrp="1"/>
+          </p:cNvSpPr>
+          <p:nvPr>
+            <p:ph type="body" sz="quarter" idx="3"/>
+          </p:nvPr>
+        </p:nvSpPr>
+        <p:spPr>
+          <a:xfrm>
+            <a:off x="685800" y="4343400"/>
+            <a:ext cx="5486400" cy="4114800"/>
+          </a:xfrm>
+          <a:prstGeom prst="rect">
+            <a:avLst/>
+          </a:prstGeom>
+        </p:spPr>
+        <p:txBody>
+          <a:bodyPr vert="horz" lIns="91440" tIns="45720" rIns="91440" bIns="45720" rtlCol="0"/>
+          <a:lstStyle/>
+          <a:p>
+            <a:pPr lvl="0"/>
+            <a:r>
+              <a:rPr lang="en-US" smtClean="0"/>
+              <a:t>Click to edit Master text styles</a:t>
+            </a:r>
+          </a:p>
+          <a:p>
+            <a:pPr lvl="1"/>
+            <a:r>
+              <a:rPr lang="en-US" smtClean="0"/>
+              <a:t>Second level</a:t>
+            </a:r>
+          </a:p>
+          <a:p>
+            <a:pPr lvl="2"/>
+            <a:r>
+              <a:rPr lang="en-US" smtClean="0"/>
+              <a:t>Third level</a:t>
+            </a:r>
+          </a:p>
+          <a:p>
+            <a:pPr lvl="3"/>
+            <a:r>
+              <a:rPr lang="en-US" smtClean="0"/>
+              <a:t>Fourth level</a:t>
+            </a:r>
+          </a:p>
+          <a:p>
+            <a:pPr lvl="4"/>
+            <a:r>
+              <a:rPr lang="en-US" smtClean="0"/>
+              <a:t>Fifth level</a:t>
+            </a:r>
+            <a:endParaRPr lang="en-US"/>
+          </a:p>
+        </p:txBody>
+      </p:sp>
+      <p:sp>
+        <p:nvSpPr>
+          <p:cNvPr id="6" name="Footer Placeholder 5"/>
+          <p:cNvSpPr>
+            <a:spLocks noGrp="1"/>
+          </p:cNvSpPr>
+          <p:nvPr>
+            <p:ph type="ftr" sz="quarter" idx="4"/>
+          </p:nvPr>
+        </p:nvSpPr>
+        <p:spPr>
+          <a:xfrm>
+            <a:off x="0" y="8685213"/>
+            <a:ext cx="2971800" cy="457200"/>
+          </a:xfrm>
+          <a:prstGeom prst="rect">
+            <a:avLst/>
+          </a:prstGeom>
+        </p:spPr>
+        <p:txBody>
+          <a:bodyPr vert="horz" lIns="91440" tIns="45720" rIns="91440" bIns="45720" rtlCol="0" anchor="b"/>
+          <a:lstStyle>
+            <a:lvl1pPr algn="l">
+              <a:defRPr sz="1200"/>
+            </a:lvl1pPr>
+          </a:lstStyle>
+          <a:p>
+            <a:endParaRPr lang="en-US"/>
+          </a:p>
+        </p:txBody>
+      </p:sp>
+      <p:sp>
+        <p:nvSpPr>
+          <p:cNvPr id="7" name="Slide Number Placeholder 6"/>
+          <p:cNvSpPr>
+            <a:spLocks noGrp="1"/>
+          </p:cNvSpPr>
+          <p:nvPr>
+            <p:ph type="sldNum" sz="quarter" idx="5"/>
+          </p:nvPr>
+        </p:nvSpPr>
+        <p:spPr>
+          <a:xfrm>
+            <a:off x="3884613" y="8685213"/>
+            <a:ext cx="2971800" cy="457200"/>
+          </a:xfrm>
+          <a:prstGeom prst="rect">
+            <a:avLst/>
+          </a:prstGeom>
+        </p:spPr>
+        <p:txBody>
+          <a:bodyPr vert="horz" lIns="91440" tIns="45720" rIns="91440" bIns="45720" rtlCol="0" anchor="b"/>
+          <a:lstStyle>
+            <a:lvl1pPr algn="r">
+              <a:defRPr sz="1200"/>
+            </a:lvl1pPr>
+          </a:lstStyle>
+          <a:p>
+            <a:fld id="{3855DCC4-D62C-8642-A02F-E018BB85B483}" type="slidenum">
+              <a:rPr lang="en-US" smtClean="0"/>
+              <a:t>‹#›</a:t>
+            </a:fld>
+            <a:endParaRPr lang="en-US"/>
+          </a:p>
+        </p:txBody>
+      </p:sp>
+    </p:spTree>
+    <p:extLst>
+      <p:ext uri="{BB962C8B-B14F-4D97-AF65-F5344CB8AC3E}">
+        <p14:creationId xmlns:p14="http://schemas.microsoft.com/office/powerpoint/2010/main" val="3861496032"/>
+      </p:ext>
+    </p:extLst>
+  </p:cSld>
+  <p:clrMap bg1="lt1" tx1="dk1" bg2="lt2" tx2="dk2" accent1="accent1" accent2="accent2" accent3="accent3" accent4="accent4" accent5="accent5" accent6="accent6" hlink="hlink" folHlink="folHlink"/>
+  <p:notesStyle>
+    <a:lvl1pPr marL="0" algn="l" defTabSz="457200" rtl="0" eaLnBrk="1" latinLnBrk="0" hangingPunct="1">
+      <a:defRPr sz="1200" kern="1200">
+        <a:solidFill>
+          <a:schemeClr val="tx1"/>
+        </a:solidFill>
+        <a:latin typeface="+mn-lt"/>
+        <a:ea typeface="+mn-ea"/>
+        <a:cs typeface="+mn-cs"/>
+      </a:defRPr>
+    </a:lvl1pPr>
+    <a:lvl2pPr marL="457200" algn="l" defTabSz="457200" rtl="0" eaLnBrk="1" latinLnBrk="0" hangingPunct="1">
+      <a:defRPr sz="1200" kern="1200">
+        <a:solidFill>
+          <a:schemeClr val="tx1"/>
+        </a:solidFill>
+        <a:latin typeface="+mn-lt"/>
+        <a:ea typeface="+mn-ea"/>
+        <a:cs typeface="+mn-cs"/>
+      </a:defRPr>
+    </a:lvl2pPr>
+    <a:lvl3pPr marL="914400" algn="l" defTabSz="457200" rtl="0" eaLnBrk="1" latinLnBrk="0" hangingPunct="1">
+      <a:defRPr sz="1200" kern="1200">
+        <a:solidFill>
+          <a:schemeClr val="tx1"/>
+        </a:solidFill>
+        <a:latin typeface="+mn-lt"/>
+        <a:ea typeface="+mn-ea"/>
+        <a:cs typeface="+mn-cs"/>
+      </a:defRPr>
+    </a:lvl3pPr>
+    <a:lvl4pPr marL="1371600" algn="l" defTabSz="457200" rtl="0" eaLnBrk="1" latinLnBrk="0" hangingPunct="1">
+      <a:defRPr sz="1200" kern="1200">
+        <a:solidFill>
+          <a:schemeClr val="tx1"/>
+        </a:solidFill>
+        <a:latin typeface="+mn-lt"/>
+        <a:ea typeface="+mn-ea"/>
+        <a:cs typeface="+mn-cs"/>
+      </a:defRPr>
+    </a:lvl4pPr>
+    <a:lvl5pPr marL="1828800" algn="l" defTabSz="457200" rtl="0" eaLnBrk="1" latinLnBrk="0" hangingPunct="1">
+      <a:defRPr sz="1200" kern="1200">
+        <a:solidFill>
+          <a:schemeClr val="tx1"/>
+        </a:solidFill>
+        <a:latin typeface="+mn-lt"/>
+        <a:ea typeface="+mn-ea"/>
+        <a:cs typeface="+mn-cs"/>
+      </a:defRPr>
+    </a:lvl5pPr>
+    <a:lvl6pPr marL="2286000" algn="l" defTabSz="457200" rtl="0" eaLnBrk="1" latinLnBrk="0" hangingPunct="1">
+      <a:defRPr sz="1200" kern="1200">
+        <a:solidFill>
+          <a:schemeClr val="tx1"/>
+        </a:solidFill>
+        <a:latin typeface="+mn-lt"/>
+        <a:ea typeface="+mn-ea"/>
+        <a:cs typeface="+mn-cs"/>
+      </a:defRPr>
+    </a:lvl6pPr>
+    <a:lvl7pPr marL="2743200" algn="l" defTabSz="457200" rtl="0" eaLnBrk="1" latinLnBrk="0" hangingPunct="1">
+      <a:defRPr sz="1200" kern="1200">
+        <a:solidFill>
+          <a:schemeClr val="tx1"/>
+        </a:solidFill>
+        <a:latin typeface="+mn-lt"/>
+        <a:ea typeface="+mn-ea"/>
+        <a:cs typeface="+mn-cs"/>
+      </a:defRPr>
+    </a:lvl7pPr>
+    <a:lvl8pPr marL="3200400" algn="l" defTabSz="457200" rtl="0" eaLnBrk="1" latinLnBrk="0" hangingPunct="1">
+      <a:defRPr sz="1200" kern="1200">
+        <a:solidFill>
+          <a:schemeClr val="tx1"/>
+        </a:solidFill>
+        <a:latin typeface="+mn-lt"/>
+        <a:ea typeface="+mn-ea"/>
+        <a:cs typeface="+mn-cs"/>
+      </a:defRPr>
+    </a:lvl8pPr>
+    <a:lvl9pPr marL="3657600" algn="l" defTabSz="457200" rtl="0" eaLnBrk="1" latinLnBrk="0" hangingPunct="1">
+      <a:defRPr sz="1200" kern="1200">
+        <a:solidFill>
+          <a:schemeClr val="tx1"/>
+        </a:solidFill>
+        <a:latin typeface="+mn-lt"/>
+        <a:ea typeface="+mn-ea"/>
+        <a:cs typeface="+mn-cs"/>
+      </a:defRPr>
+    </a:lvl9pPr>
+  </p:notesStyle>
+</p:notesMaster>
+</file>
+
+<file path=ppt/notesSlides/notesSlide1.xml><?xml version="1.0" encoding="utf-8"?>
+<p:notes xmlns:a="http://schemas.openxmlformats.org/drawingml/2006/main" xmlns:r="http://schemas.openxmlformats.org/officeDocument/2006/relationships" xmlns:p="http://schemas.openxmlformats.org/presentationml/2006/main">
+  <p:cSld>
+    <p:spTree>
+      <p:nvGrpSpPr>
+        <p:cNvPr id="1" name=""/>
+        <p:cNvGrpSpPr/>
+        <p:nvPr/>
+      </p:nvGrpSpPr>
+      <p:grpSpPr>
+        <a:xfrm>
+          <a:off x="0" y="0"/>
+          <a:ext cx="0" cy="0"/>
+          <a:chOff x="0" y="0"/>
+          <a:chExt cx="0" cy="0"/>
+        </a:xfrm>
+      </p:grpSpPr>
+      <p:sp>
+        <p:nvSpPr>
+          <p:cNvPr id="2" name="Slide Image Placeholder 1"/>
+          <p:cNvSpPr>
+            <a:spLocks noGrp="1" noRot="1" noChangeAspect="1"/>
+          </p:cNvSpPr>
+          <p:nvPr>
+            <p:ph type="sldImg"/>
+          </p:nvPr>
+        </p:nvSpPr>
+        <p:spPr/>
+      </p:sp>
+      <p:sp>
+        <p:nvSpPr>
+          <p:cNvPr id="3" name="Notes Placeholder 2"/>
+          <p:cNvSpPr>
+            <a:spLocks noGrp="1"/>
+          </p:cNvSpPr>
+          <p:nvPr>
+            <p:ph type="body" idx="1"/>
+          </p:nvPr>
+        </p:nvSpPr>
+        <p:spPr/>
+        <p:txBody>
+          <a:bodyPr/>
+          <a:lstStyle/>
+          <a:p>
+            <a:endParaRPr lang="en-US" dirty="0"/>
+          </a:p>
+        </p:txBody>
+      </p:sp>
+      <p:sp>
+        <p:nvSpPr>
+          <p:cNvPr id="4" name="Slide Number Placeholder 3"/>
+          <p:cNvSpPr>
+            <a:spLocks noGrp="1"/>
+          </p:cNvSpPr>
+          <p:nvPr>
+            <p:ph type="sldNum" sz="quarter" idx="10"/>
+          </p:nvPr>
+        </p:nvSpPr>
+        <p:spPr/>
+        <p:txBody>
+          <a:bodyPr/>
+          <a:lstStyle/>
+          <a:p>
+            <a:fld id="{3855DCC4-D62C-8642-A02F-E018BB85B483}" type="slidenum">
+              <a:rPr lang="en-US" smtClean="0"/>
+              <a:t>5</a:t>
+            </a:fld>
+            <a:endParaRPr lang="en-US"/>
+          </a:p>
+        </p:txBody>
+      </p:sp>
+    </p:spTree>
+    <p:extLst>
+      <p:ext uri="{BB962C8B-B14F-4D97-AF65-F5344CB8AC3E}">
+        <p14:creationId xmlns:p14="http://schemas.microsoft.com/office/powerpoint/2010/main" val="485525249"/>
+      </p:ext>
+    </p:extLst>
+  </p:cSld>
+  <p:clrMapOvr>
+    <a:masterClrMapping/>
+  </p:clrMapOvr>
+</p:notes>
+</file>
+
 <file path=ppt/slideLayouts/slideLayout1.xml><?xml version="1.0" encoding="utf-8"?>
 <p:sldLayout xmlns:a="http://schemas.openxmlformats.org/drawingml/2006/main" xmlns:r="http://schemas.openxmlformats.org/officeDocument/2006/relationships" xmlns:p="http://schemas.openxmlformats.org/presentationml/2006/main" type="title" preserve="1">
   <p:cSld name="Title Slide">
@@ -298,7 +736,7 @@
           <a:p>
             <a:fld id="{3BF6A0BD-4DF4-B04A-8708-4D6C16274A6A}" type="datetimeFigureOut">
               <a:rPr lang="en-US" smtClean="0"/>
-              <a:t>9/22/21</a:t>
+              <a:t>9/28/21</a:t>
             </a:fld>
             <a:endParaRPr lang="en-US"/>
           </a:p>
@@ -468,7 +906,7 @@
           <a:p>
             <a:fld id="{3BF6A0BD-4DF4-B04A-8708-4D6C16274A6A}" type="datetimeFigureOut">
               <a:rPr lang="en-US" smtClean="0"/>
-              <a:t>9/22/21</a:t>
+              <a:t>9/28/21</a:t>
             </a:fld>
             <a:endParaRPr lang="en-US"/>
           </a:p>
@@ -648,7 +1086,7 @@
           <a:p>
             <a:fld id="{3BF6A0BD-4DF4-B04A-8708-4D6C16274A6A}" type="datetimeFigureOut">
               <a:rPr lang="en-US" smtClean="0"/>
-              <a:t>9/22/21</a:t>
+              <a:t>9/28/21</a:t>
             </a:fld>
             <a:endParaRPr lang="en-US"/>
           </a:p>
@@ -818,7 +1256,7 @@
           <a:p>
             <a:fld id="{3BF6A0BD-4DF4-B04A-8708-4D6C16274A6A}" type="datetimeFigureOut">
               <a:rPr lang="en-US" smtClean="0"/>
-              <a:t>9/22/21</a:t>
+              <a:t>9/28/21</a:t>
             </a:fld>
             <a:endParaRPr lang="en-US"/>
           </a:p>
@@ -1064,7 +1502,7 @@
           <a:p>
             <a:fld id="{3BF6A0BD-4DF4-B04A-8708-4D6C16274A6A}" type="datetimeFigureOut">
               <a:rPr lang="en-US" smtClean="0"/>
-              <a:t>9/22/21</a:t>
+              <a:t>9/28/21</a:t>
             </a:fld>
             <a:endParaRPr lang="en-US"/>
           </a:p>
@@ -1352,7 +1790,7 @@
           <a:p>
             <a:fld id="{3BF6A0BD-4DF4-B04A-8708-4D6C16274A6A}" type="datetimeFigureOut">
               <a:rPr lang="en-US" smtClean="0"/>
-              <a:t>9/22/21</a:t>
+              <a:t>9/28/21</a:t>
             </a:fld>
             <a:endParaRPr lang="en-US"/>
           </a:p>
@@ -1774,7 +2212,7 @@
           <a:p>
             <a:fld id="{3BF6A0BD-4DF4-B04A-8708-4D6C16274A6A}" type="datetimeFigureOut">
               <a:rPr lang="en-US" smtClean="0"/>
-              <a:t>9/22/21</a:t>
+              <a:t>9/28/21</a:t>
             </a:fld>
             <a:endParaRPr lang="en-US"/>
           </a:p>
@@ -1892,7 +2330,7 @@
           <a:p>
             <a:fld id="{3BF6A0BD-4DF4-B04A-8708-4D6C16274A6A}" type="datetimeFigureOut">
               <a:rPr lang="en-US" smtClean="0"/>
-              <a:t>9/22/21</a:t>
+              <a:t>9/28/21</a:t>
             </a:fld>
             <a:endParaRPr lang="en-US"/>
           </a:p>
@@ -1987,7 +2425,7 @@
           <a:p>
             <a:fld id="{3BF6A0BD-4DF4-B04A-8708-4D6C16274A6A}" type="datetimeFigureOut">
               <a:rPr lang="en-US" smtClean="0"/>
-              <a:t>9/22/21</a:t>
+              <a:t>9/28/21</a:t>
             </a:fld>
             <a:endParaRPr lang="en-US"/>
           </a:p>
@@ -2264,7 +2702,7 @@
           <a:p>
             <a:fld id="{3BF6A0BD-4DF4-B04A-8708-4D6C16274A6A}" type="datetimeFigureOut">
               <a:rPr lang="en-US" smtClean="0"/>
-              <a:t>9/22/21</a:t>
+              <a:t>9/28/21</a:t>
             </a:fld>
             <a:endParaRPr lang="en-US"/>
           </a:p>
@@ -2517,7 +2955,7 @@
           <a:p>
             <a:fld id="{3BF6A0BD-4DF4-B04A-8708-4D6C16274A6A}" type="datetimeFigureOut">
               <a:rPr lang="en-US" smtClean="0"/>
-              <a:t>9/22/21</a:t>
+              <a:t>9/28/21</a:t>
             </a:fld>
             <a:endParaRPr lang="en-US"/>
           </a:p>
@@ -2730,7 +3168,7 @@
           <a:p>
             <a:fld id="{3BF6A0BD-4DF4-B04A-8708-4D6C16274A6A}" type="datetimeFigureOut">
               <a:rPr lang="en-US" smtClean="0"/>
-              <a:t>9/22/21</a:t>
+              <a:t>9/28/21</a:t>
             </a:fld>
             <a:endParaRPr lang="en-US"/>
           </a:p>
@@ -6564,6 +7002,703 @@
 </p:sld>
 </file>
 
+<file path=ppt/slides/slide12.xml><?xml version="1.0" encoding="utf-8"?>
+<p:sld xmlns:a="http://schemas.openxmlformats.org/drawingml/2006/main" xmlns:r="http://schemas.openxmlformats.org/officeDocument/2006/relationships" xmlns:p="http://schemas.openxmlformats.org/presentationml/2006/main">
+  <p:cSld>
+    <p:spTree>
+      <p:nvGrpSpPr>
+        <p:cNvPr id="1" name=""/>
+        <p:cNvGrpSpPr/>
+        <p:nvPr/>
+      </p:nvGrpSpPr>
+      <p:grpSpPr>
+        <a:xfrm>
+          <a:off x="0" y="0"/>
+          <a:ext cx="0" cy="0"/>
+          <a:chOff x="0" y="0"/>
+          <a:chExt cx="0" cy="0"/>
+        </a:xfrm>
+      </p:grpSpPr>
+      <p:cxnSp>
+        <p:nvCxnSpPr>
+          <p:cNvPr id="4" name="Straight Arrow Connector 3"/>
+          <p:cNvCxnSpPr/>
+          <p:nvPr/>
+        </p:nvCxnSpPr>
+        <p:spPr>
+          <a:xfrm>
+            <a:off x="161893" y="2023919"/>
+            <a:ext cx="8066931" cy="0"/>
+          </a:xfrm>
+          <a:prstGeom prst="straightConnector1">
+            <a:avLst/>
+          </a:prstGeom>
+          <a:ln w="76200" cmpd="sng">
+            <a:tailEnd type="arrow"/>
+          </a:ln>
+        </p:spPr>
+        <p:style>
+          <a:lnRef idx="2">
+            <a:schemeClr val="accent1"/>
+          </a:lnRef>
+          <a:fillRef idx="0">
+            <a:schemeClr val="accent1"/>
+          </a:fillRef>
+          <a:effectRef idx="1">
+            <a:schemeClr val="accent1"/>
+          </a:effectRef>
+          <a:fontRef idx="minor">
+            <a:schemeClr val="tx1"/>
+          </a:fontRef>
+        </p:style>
+      </p:cxnSp>
+      <p:cxnSp>
+        <p:nvCxnSpPr>
+          <p:cNvPr id="6" name="Straight Arrow Connector 5"/>
+          <p:cNvCxnSpPr/>
+          <p:nvPr/>
+        </p:nvCxnSpPr>
+        <p:spPr>
+          <a:xfrm>
+            <a:off x="161893" y="3030806"/>
+            <a:ext cx="8066931" cy="0"/>
+          </a:xfrm>
+          <a:prstGeom prst="straightConnector1">
+            <a:avLst/>
+          </a:prstGeom>
+          <a:ln w="76200" cmpd="sng">
+            <a:tailEnd type="arrow"/>
+          </a:ln>
+        </p:spPr>
+        <p:style>
+          <a:lnRef idx="2">
+            <a:schemeClr val="accent1"/>
+          </a:lnRef>
+          <a:fillRef idx="0">
+            <a:schemeClr val="accent1"/>
+          </a:fillRef>
+          <a:effectRef idx="1">
+            <a:schemeClr val="accent1"/>
+          </a:effectRef>
+          <a:fontRef idx="minor">
+            <a:schemeClr val="tx1"/>
+          </a:fontRef>
+        </p:style>
+      </p:cxnSp>
+      <p:cxnSp>
+        <p:nvCxnSpPr>
+          <p:cNvPr id="7" name="Straight Arrow Connector 6"/>
+          <p:cNvCxnSpPr/>
+          <p:nvPr/>
+        </p:nvCxnSpPr>
+        <p:spPr>
+          <a:xfrm>
+            <a:off x="2756332" y="2048694"/>
+            <a:ext cx="584287" cy="1012295"/>
+          </a:xfrm>
+          <a:prstGeom prst="straightConnector1">
+            <a:avLst/>
+          </a:prstGeom>
+          <a:ln w="76200" cmpd="sng">
+            <a:solidFill>
+              <a:srgbClr val="FF0000"/>
+            </a:solidFill>
+            <a:tailEnd type="arrow"/>
+          </a:ln>
+        </p:spPr>
+        <p:style>
+          <a:lnRef idx="2">
+            <a:schemeClr val="accent1"/>
+          </a:lnRef>
+          <a:fillRef idx="0">
+            <a:schemeClr val="accent1"/>
+          </a:fillRef>
+          <a:effectRef idx="1">
+            <a:schemeClr val="accent1"/>
+          </a:effectRef>
+          <a:fontRef idx="minor">
+            <a:schemeClr val="tx1"/>
+          </a:fontRef>
+        </p:style>
+      </p:cxnSp>
+      <p:sp>
+        <p:nvSpPr>
+          <p:cNvPr id="22" name="TextBox 21"/>
+          <p:cNvSpPr txBox="1"/>
+          <p:nvPr/>
+        </p:nvSpPr>
+        <p:spPr>
+          <a:xfrm>
+            <a:off x="7359501" y="1439143"/>
+            <a:ext cx="522160" cy="707886"/>
+          </a:xfrm>
+          <a:prstGeom prst="rect">
+            <a:avLst/>
+          </a:prstGeom>
+          <a:noFill/>
+        </p:spPr>
+        <p:txBody>
+          <a:bodyPr wrap="square" rtlCol="0">
+            <a:spAutoFit/>
+          </a:bodyPr>
+          <a:lstStyle/>
+          <a:p>
+            <a:r>
+              <a:rPr lang="en-US" sz="4000" b="1" dirty="0" smtClean="0"/>
+              <a:t>A</a:t>
+            </a:r>
+            <a:endParaRPr lang="en-US" sz="4000" b="1" dirty="0"/>
+          </a:p>
+        </p:txBody>
+      </p:sp>
+      <p:sp>
+        <p:nvSpPr>
+          <p:cNvPr id="23" name="TextBox 22"/>
+          <p:cNvSpPr txBox="1"/>
+          <p:nvPr/>
+        </p:nvSpPr>
+        <p:spPr>
+          <a:xfrm>
+            <a:off x="7434336" y="2476212"/>
+            <a:ext cx="497614" cy="707886"/>
+          </a:xfrm>
+          <a:prstGeom prst="rect">
+            <a:avLst/>
+          </a:prstGeom>
+          <a:noFill/>
+        </p:spPr>
+        <p:txBody>
+          <a:bodyPr wrap="square" rtlCol="0">
+            <a:spAutoFit/>
+          </a:bodyPr>
+          <a:lstStyle/>
+          <a:p>
+            <a:r>
+              <a:rPr lang="en-US" sz="4000" b="1" dirty="0"/>
+              <a:t>B</a:t>
+            </a:r>
+          </a:p>
+        </p:txBody>
+      </p:sp>
+      <p:cxnSp>
+        <p:nvCxnSpPr>
+          <p:cNvPr id="28" name="Straight Arrow Connector 27"/>
+          <p:cNvCxnSpPr/>
+          <p:nvPr/>
+        </p:nvCxnSpPr>
+        <p:spPr>
+          <a:xfrm>
+            <a:off x="715121" y="2048693"/>
+            <a:ext cx="735070" cy="982113"/>
+          </a:xfrm>
+          <a:prstGeom prst="straightConnector1">
+            <a:avLst/>
+          </a:prstGeom>
+          <a:ln w="76200" cmpd="sng">
+            <a:solidFill>
+              <a:srgbClr val="FF0000"/>
+            </a:solidFill>
+            <a:tailEnd type="arrow"/>
+          </a:ln>
+        </p:spPr>
+        <p:style>
+          <a:lnRef idx="2">
+            <a:schemeClr val="accent1"/>
+          </a:lnRef>
+          <a:fillRef idx="0">
+            <a:schemeClr val="accent1"/>
+          </a:fillRef>
+          <a:effectRef idx="1">
+            <a:schemeClr val="accent1"/>
+          </a:effectRef>
+          <a:fontRef idx="minor">
+            <a:schemeClr val="tx1"/>
+          </a:fontRef>
+        </p:style>
+      </p:cxnSp>
+      <p:cxnSp>
+        <p:nvCxnSpPr>
+          <p:cNvPr id="38" name="Straight Arrow Connector 37"/>
+          <p:cNvCxnSpPr/>
+          <p:nvPr/>
+        </p:nvCxnSpPr>
+        <p:spPr>
+          <a:xfrm>
+            <a:off x="3463185" y="2048694"/>
+            <a:ext cx="584287" cy="1012295"/>
+          </a:xfrm>
+          <a:prstGeom prst="straightConnector1">
+            <a:avLst/>
+          </a:prstGeom>
+          <a:ln w="76200" cmpd="sng">
+            <a:solidFill>
+              <a:srgbClr val="FF0000"/>
+            </a:solidFill>
+            <a:tailEnd type="arrow"/>
+          </a:ln>
+        </p:spPr>
+        <p:style>
+          <a:lnRef idx="2">
+            <a:schemeClr val="accent1"/>
+          </a:lnRef>
+          <a:fillRef idx="0">
+            <a:schemeClr val="accent1"/>
+          </a:fillRef>
+          <a:effectRef idx="1">
+            <a:schemeClr val="accent1"/>
+          </a:effectRef>
+          <a:fontRef idx="minor">
+            <a:schemeClr val="tx1"/>
+          </a:fontRef>
+        </p:style>
+      </p:cxnSp>
+      <p:cxnSp>
+        <p:nvCxnSpPr>
+          <p:cNvPr id="39" name="Straight Arrow Connector 38"/>
+          <p:cNvCxnSpPr/>
+          <p:nvPr/>
+        </p:nvCxnSpPr>
+        <p:spPr>
+          <a:xfrm>
+            <a:off x="4232278" y="2101727"/>
+            <a:ext cx="584287" cy="1012295"/>
+          </a:xfrm>
+          <a:prstGeom prst="straightConnector1">
+            <a:avLst/>
+          </a:prstGeom>
+          <a:ln w="76200" cmpd="sng">
+            <a:solidFill>
+              <a:srgbClr val="FF0000"/>
+            </a:solidFill>
+            <a:tailEnd type="arrow"/>
+          </a:ln>
+        </p:spPr>
+        <p:style>
+          <a:lnRef idx="2">
+            <a:schemeClr val="accent1"/>
+          </a:lnRef>
+          <a:fillRef idx="0">
+            <a:schemeClr val="accent1"/>
+          </a:fillRef>
+          <a:effectRef idx="1">
+            <a:schemeClr val="accent1"/>
+          </a:effectRef>
+          <a:fontRef idx="minor">
+            <a:schemeClr val="tx1"/>
+          </a:fontRef>
+        </p:style>
+      </p:cxnSp>
+      <p:sp>
+        <p:nvSpPr>
+          <p:cNvPr id="3" name="Freeform 2"/>
+          <p:cNvSpPr/>
+          <p:nvPr/>
+        </p:nvSpPr>
+        <p:spPr>
+          <a:xfrm>
+            <a:off x="2446636" y="1328915"/>
+            <a:ext cx="2633649" cy="2274049"/>
+          </a:xfrm>
+          <a:custGeom>
+            <a:avLst/>
+            <a:gdLst>
+              <a:gd name="connsiteX0" fmla="*/ 2499173 w 2499173"/>
+              <a:gd name="connsiteY0" fmla="*/ 0 h 2274049"/>
+              <a:gd name="connsiteX1" fmla="*/ 2007532 w 2499173"/>
+              <a:gd name="connsiteY1" fmla="*/ 983373 h 2274049"/>
+              <a:gd name="connsiteX2" fmla="*/ 204850 w 2499173"/>
+              <a:gd name="connsiteY2" fmla="*/ 1188242 h 2274049"/>
+              <a:gd name="connsiteX3" fmla="*/ 40970 w 2499173"/>
+              <a:gd name="connsiteY3" fmla="*/ 2274049 h 2274049"/>
+              <a:gd name="connsiteX4" fmla="*/ 40970 w 2499173"/>
+              <a:gd name="connsiteY4" fmla="*/ 2274049 h 2274049"/>
+            </a:gdLst>
+            <a:ahLst/>
+            <a:cxnLst>
+              <a:cxn ang="0">
+                <a:pos x="connsiteX0" y="connsiteY0"/>
+              </a:cxn>
+              <a:cxn ang="0">
+                <a:pos x="connsiteX1" y="connsiteY1"/>
+              </a:cxn>
+              <a:cxn ang="0">
+                <a:pos x="connsiteX2" y="connsiteY2"/>
+              </a:cxn>
+              <a:cxn ang="0">
+                <a:pos x="connsiteX3" y="connsiteY3"/>
+              </a:cxn>
+              <a:cxn ang="0">
+                <a:pos x="connsiteX4" y="connsiteY4"/>
+              </a:cxn>
+            </a:cxnLst>
+            <a:rect l="l" t="t" r="r" b="b"/>
+            <a:pathLst>
+              <a:path w="2499173" h="2274049">
+                <a:moveTo>
+                  <a:pt x="2499173" y="0"/>
+                </a:moveTo>
+                <a:cubicBezTo>
+                  <a:pt x="2444546" y="392666"/>
+                  <a:pt x="2389919" y="785333"/>
+                  <a:pt x="2007532" y="983373"/>
+                </a:cubicBezTo>
+                <a:cubicBezTo>
+                  <a:pt x="1625145" y="1181413"/>
+                  <a:pt x="532610" y="973129"/>
+                  <a:pt x="204850" y="1188242"/>
+                </a:cubicBezTo>
+                <a:cubicBezTo>
+                  <a:pt x="-122910" y="1403355"/>
+                  <a:pt x="40970" y="2274049"/>
+                  <a:pt x="40970" y="2274049"/>
+                </a:cubicBezTo>
+                <a:lnTo>
+                  <a:pt x="40970" y="2274049"/>
+                </a:lnTo>
+              </a:path>
+            </a:pathLst>
+          </a:custGeom>
+          <a:ln w="76200" cmpd="sng">
+            <a:solidFill>
+              <a:srgbClr val="660066"/>
+            </a:solidFill>
+          </a:ln>
+        </p:spPr>
+        <p:style>
+          <a:lnRef idx="2">
+            <a:schemeClr val="accent1"/>
+          </a:lnRef>
+          <a:fillRef idx="0">
+            <a:schemeClr val="accent1"/>
+          </a:fillRef>
+          <a:effectRef idx="1">
+            <a:schemeClr val="accent1"/>
+          </a:effectRef>
+          <a:fontRef idx="minor">
+            <a:schemeClr val="tx1"/>
+          </a:fontRef>
+        </p:style>
+        <p:txBody>
+          <a:bodyPr rtlCol="0" anchor="ctr"/>
+          <a:lstStyle/>
+          <a:p>
+            <a:pPr algn="ctr"/>
+            <a:endParaRPr lang="en-US" sz="4000"/>
+          </a:p>
+        </p:txBody>
+      </p:sp>
+      <p:cxnSp>
+        <p:nvCxnSpPr>
+          <p:cNvPr id="8" name="Straight Arrow Connector 7"/>
+          <p:cNvCxnSpPr/>
+          <p:nvPr/>
+        </p:nvCxnSpPr>
+        <p:spPr>
+          <a:xfrm>
+            <a:off x="93622" y="1439143"/>
+            <a:ext cx="4986663" cy="0"/>
+          </a:xfrm>
+          <a:prstGeom prst="straightConnector1">
+            <a:avLst/>
+          </a:prstGeom>
+          <a:ln w="57150" cmpd="sng">
+            <a:headEnd type="arrow"/>
+            <a:tailEnd type="arrow"/>
+          </a:ln>
+        </p:spPr>
+        <p:style>
+          <a:lnRef idx="2">
+            <a:schemeClr val="accent1"/>
+          </a:lnRef>
+          <a:fillRef idx="0">
+            <a:schemeClr val="accent1"/>
+          </a:fillRef>
+          <a:effectRef idx="1">
+            <a:schemeClr val="accent1"/>
+          </a:effectRef>
+          <a:fontRef idx="minor">
+            <a:schemeClr val="tx1"/>
+          </a:fontRef>
+        </p:style>
+      </p:cxnSp>
+      <p:sp>
+        <p:nvSpPr>
+          <p:cNvPr id="9" name="TextBox 8"/>
+          <p:cNvSpPr txBox="1"/>
+          <p:nvPr/>
+        </p:nvSpPr>
+        <p:spPr>
+          <a:xfrm>
+            <a:off x="1351893" y="329396"/>
+            <a:ext cx="1411396" cy="707886"/>
+          </a:xfrm>
+          <a:prstGeom prst="rect">
+            <a:avLst/>
+          </a:prstGeom>
+          <a:noFill/>
+        </p:spPr>
+        <p:txBody>
+          <a:bodyPr wrap="square" rtlCol="0">
+            <a:spAutoFit/>
+          </a:bodyPr>
+          <a:lstStyle/>
+          <a:p>
+            <a:r>
+              <a:rPr lang="en-US" sz="4000" dirty="0" smtClean="0"/>
+              <a:t>C</a:t>
+            </a:r>
+            <a:r>
+              <a:rPr lang="en-US" sz="4000" baseline="-25000" dirty="0" smtClean="0"/>
+              <a:t>s</a:t>
+            </a:r>
+            <a:r>
+              <a:rPr lang="en-US" sz="4000" dirty="0" smtClean="0"/>
+              <a:t> = 4</a:t>
+            </a:r>
+            <a:endParaRPr lang="en-US" sz="4000" baseline="-25000" dirty="0"/>
+          </a:p>
+        </p:txBody>
+      </p:sp>
+      <p:cxnSp>
+        <p:nvCxnSpPr>
+          <p:cNvPr id="44" name="Straight Arrow Connector 43"/>
+          <p:cNvCxnSpPr>
+            <a:endCxn id="3" idx="3"/>
+          </p:cNvCxnSpPr>
+          <p:nvPr/>
+        </p:nvCxnSpPr>
+        <p:spPr>
+          <a:xfrm>
+            <a:off x="348245" y="3599262"/>
+            <a:ext cx="2141566" cy="3702"/>
+          </a:xfrm>
+          <a:prstGeom prst="straightConnector1">
+            <a:avLst/>
+          </a:prstGeom>
+          <a:ln w="57150" cmpd="sng">
+            <a:headEnd type="arrow"/>
+            <a:tailEnd type="arrow"/>
+          </a:ln>
+        </p:spPr>
+        <p:style>
+          <a:lnRef idx="2">
+            <a:schemeClr val="accent1"/>
+          </a:lnRef>
+          <a:fillRef idx="0">
+            <a:schemeClr val="accent1"/>
+          </a:fillRef>
+          <a:effectRef idx="1">
+            <a:schemeClr val="accent1"/>
+          </a:effectRef>
+          <a:fontRef idx="minor">
+            <a:schemeClr val="tx1"/>
+          </a:fontRef>
+        </p:style>
+      </p:cxnSp>
+      <p:sp>
+        <p:nvSpPr>
+          <p:cNvPr id="46" name="TextBox 45"/>
+          <p:cNvSpPr txBox="1"/>
+          <p:nvPr/>
+        </p:nvSpPr>
+        <p:spPr>
+          <a:xfrm>
+            <a:off x="593167" y="3636783"/>
+            <a:ext cx="1396087" cy="707886"/>
+          </a:xfrm>
+          <a:prstGeom prst="rect">
+            <a:avLst/>
+          </a:prstGeom>
+          <a:noFill/>
+        </p:spPr>
+        <p:txBody>
+          <a:bodyPr wrap="square" rtlCol="0">
+            <a:spAutoFit/>
+          </a:bodyPr>
+          <a:lstStyle/>
+          <a:p>
+            <a:r>
+              <a:rPr lang="en-US" sz="4000" dirty="0" smtClean="0"/>
+              <a:t>C</a:t>
+            </a:r>
+            <a:r>
+              <a:rPr lang="en-US" sz="4000" baseline="-25000" dirty="0"/>
+              <a:t>r</a:t>
+            </a:r>
+            <a:r>
+              <a:rPr lang="en-US" sz="4000" dirty="0" smtClean="0"/>
+              <a:t> = 1</a:t>
+            </a:r>
+            <a:endParaRPr lang="en-US" sz="4000" baseline="-25000" dirty="0"/>
+          </a:p>
+        </p:txBody>
+      </p:sp>
+      <p:cxnSp>
+        <p:nvCxnSpPr>
+          <p:cNvPr id="47" name="Straight Arrow Connector 46"/>
+          <p:cNvCxnSpPr/>
+          <p:nvPr/>
+        </p:nvCxnSpPr>
+        <p:spPr>
+          <a:xfrm>
+            <a:off x="2498575" y="3595560"/>
+            <a:ext cx="2418813" cy="0"/>
+          </a:xfrm>
+          <a:prstGeom prst="straightConnector1">
+            <a:avLst/>
+          </a:prstGeom>
+          <a:ln w="57150" cmpd="sng">
+            <a:headEnd type="arrow"/>
+            <a:tailEnd type="arrow"/>
+          </a:ln>
+        </p:spPr>
+        <p:style>
+          <a:lnRef idx="2">
+            <a:schemeClr val="accent1"/>
+          </a:lnRef>
+          <a:fillRef idx="0">
+            <a:schemeClr val="accent1"/>
+          </a:fillRef>
+          <a:effectRef idx="1">
+            <a:schemeClr val="accent1"/>
+          </a:effectRef>
+          <a:fontRef idx="minor">
+            <a:schemeClr val="tx1"/>
+          </a:fontRef>
+        </p:style>
+      </p:cxnSp>
+      <p:sp>
+        <p:nvSpPr>
+          <p:cNvPr id="49" name="TextBox 48"/>
+          <p:cNvSpPr txBox="1"/>
+          <p:nvPr/>
+        </p:nvSpPr>
+        <p:spPr>
+          <a:xfrm>
+            <a:off x="860371" y="4826768"/>
+            <a:ext cx="7784307" cy="1323439"/>
+          </a:xfrm>
+          <a:prstGeom prst="rect">
+            <a:avLst/>
+          </a:prstGeom>
+          <a:noFill/>
+        </p:spPr>
+        <p:txBody>
+          <a:bodyPr wrap="square" rtlCol="0">
+            <a:spAutoFit/>
+          </a:bodyPr>
+          <a:lstStyle/>
+          <a:p>
+            <a:r>
+              <a:rPr lang="en-US" sz="4000" dirty="0" smtClean="0"/>
+              <a:t>Number of messages in the channel in the snapshot is C</a:t>
+            </a:r>
+            <a:r>
+              <a:rPr lang="en-US" sz="4000" baseline="-25000" dirty="0" smtClean="0"/>
+              <a:t>s</a:t>
+            </a:r>
+            <a:r>
+              <a:rPr lang="en-US" sz="4000" dirty="0" smtClean="0"/>
+              <a:t> – C</a:t>
+            </a:r>
+            <a:r>
+              <a:rPr lang="en-US" sz="4000" baseline="-25000" dirty="0" smtClean="0"/>
+              <a:t>r</a:t>
+            </a:r>
+            <a:r>
+              <a:rPr lang="en-US" sz="4000" dirty="0" smtClean="0"/>
+              <a:t>= 3  </a:t>
+            </a:r>
+            <a:endParaRPr lang="en-US" sz="4000" baseline="-25000" dirty="0"/>
+          </a:p>
+        </p:txBody>
+      </p:sp>
+      <p:cxnSp>
+        <p:nvCxnSpPr>
+          <p:cNvPr id="16" name="Straight Arrow Connector 15"/>
+          <p:cNvCxnSpPr>
+            <a:stCxn id="49" idx="0"/>
+          </p:cNvCxnSpPr>
+          <p:nvPr/>
+        </p:nvCxnSpPr>
+        <p:spPr>
+          <a:xfrm flipH="1" flipV="1">
+            <a:off x="4027435" y="3636784"/>
+            <a:ext cx="725090" cy="1189984"/>
+          </a:xfrm>
+          <a:prstGeom prst="straightConnector1">
+            <a:avLst/>
+          </a:prstGeom>
+          <a:ln>
+            <a:prstDash val="dash"/>
+            <a:tailEnd type="arrow"/>
+          </a:ln>
+        </p:spPr>
+        <p:style>
+          <a:lnRef idx="2">
+            <a:schemeClr val="accent1"/>
+          </a:lnRef>
+          <a:fillRef idx="0">
+            <a:schemeClr val="accent1"/>
+          </a:fillRef>
+          <a:effectRef idx="1">
+            <a:schemeClr val="accent1"/>
+          </a:effectRef>
+          <a:fontRef idx="minor">
+            <a:schemeClr val="tx1"/>
+          </a:fontRef>
+        </p:style>
+      </p:cxnSp>
+      <p:cxnSp>
+        <p:nvCxnSpPr>
+          <p:cNvPr id="26" name="Straight Connector 25"/>
+          <p:cNvCxnSpPr/>
+          <p:nvPr/>
+        </p:nvCxnSpPr>
+        <p:spPr>
+          <a:xfrm>
+            <a:off x="4917388" y="1886759"/>
+            <a:ext cx="0" cy="2187405"/>
+          </a:xfrm>
+          <a:prstGeom prst="line">
+            <a:avLst/>
+          </a:prstGeom>
+        </p:spPr>
+        <p:style>
+          <a:lnRef idx="2">
+            <a:schemeClr val="accent1"/>
+          </a:lnRef>
+          <a:fillRef idx="0">
+            <a:schemeClr val="accent1"/>
+          </a:fillRef>
+          <a:effectRef idx="1">
+            <a:schemeClr val="accent1"/>
+          </a:effectRef>
+          <a:fontRef idx="minor">
+            <a:schemeClr val="tx1"/>
+          </a:fontRef>
+        </p:style>
+      </p:cxnSp>
+    </p:spTree>
+    <p:extLst>
+      <p:ext uri="{BB962C8B-B14F-4D97-AF65-F5344CB8AC3E}">
+        <p14:creationId xmlns:p14="http://schemas.microsoft.com/office/powerpoint/2010/main" val="1093408707"/>
+      </p:ext>
+    </p:extLst>
+  </p:cSld>
+  <p:clrMapOvr>
+    <a:masterClrMapping/>
+  </p:clrMapOvr>
+  <p:timing>
+    <p:tnLst>
+      <p:par>
+        <p:cTn xmlns:p14="http://schemas.microsoft.com/office/powerpoint/2010/main" id="1" dur="indefinite" restart="never" nodeType="tmRoot"/>
+      </p:par>
+    </p:tnLst>
+  </p:timing>
+</p:sld>
+</file>
+
 <file path=ppt/slides/slide2.xml><?xml version="1.0" encoding="utf-8"?>
 <p:sld xmlns:a="http://schemas.openxmlformats.org/drawingml/2006/main" xmlns:r="http://schemas.openxmlformats.org/officeDocument/2006/relationships" xmlns:p="http://schemas.openxmlformats.org/presentationml/2006/main">
   <p:cSld>
@@ -8211,29 +9346,8 @@
                   <a:srgbClr val="000000"/>
                 </a:solidFill>
               </a:rPr>
-              <a:t> = </a:t>
-            </a:r>
-            <a:r>
-              <a:rPr lang="en-US" sz="3600" b="1" dirty="0" smtClean="0">
-                <a:solidFill>
-                  <a:srgbClr val="000000"/>
-                </a:solidFill>
-              </a:rPr>
-              <a:t>-1</a:t>
-            </a:r>
-            <a:r>
-              <a:rPr lang="en-US" sz="3600" b="1" dirty="0" smtClean="0">
-                <a:solidFill>
-                  <a:srgbClr val="000000"/>
-                </a:solidFill>
-              </a:rPr>
-              <a:t>,</a:t>
-            </a:r>
-            <a:endParaRPr lang="en-US" sz="3600" b="1" dirty="0" smtClean="0">
-              <a:solidFill>
-                <a:srgbClr val="000000"/>
-              </a:solidFill>
-            </a:endParaRPr>
+              <a:t> = -1,</a:t>
+            </a:r>
           </a:p>
           <a:p>
             <a:pPr algn="ctr"/>
@@ -8299,21 +9413,8 @@
                   <a:srgbClr val="000000"/>
                 </a:solidFill>
               </a:rPr>
-              <a:t> = </a:t>
-            </a:r>
-            <a:r>
-              <a:rPr lang="en-US" sz="3600" b="1" dirty="0" smtClean="0">
-                <a:solidFill>
-                  <a:srgbClr val="000000"/>
-                </a:solidFill>
-              </a:rPr>
-              <a:t>-1,</a:t>
-            </a:r>
-            <a:endParaRPr lang="en-US" sz="3600" b="1" dirty="0" smtClean="0">
-              <a:solidFill>
-                <a:srgbClr val="000000"/>
-              </a:solidFill>
-            </a:endParaRPr>
+              <a:t> = -1,</a:t>
+            </a:r>
           </a:p>
           <a:p>
             <a:pPr algn="ctr"/>
@@ -9379,15 +10480,7 @@
                   <a:srgbClr val="000000"/>
                 </a:solidFill>
               </a:rPr>
-              <a:t> = </a:t>
-            </a:r>
-            <a:r>
-              <a:rPr lang="en-US" sz="3600" b="1" dirty="0" smtClean="0">
-                <a:solidFill>
-                  <a:srgbClr val="000000"/>
-                </a:solidFill>
-              </a:rPr>
-              <a:t>-1, </a:t>
+              <a:t> = -1, </a:t>
             </a:r>
             <a:r>
               <a:rPr lang="en-US" sz="3600" b="1" dirty="0" err="1" smtClean="0">
@@ -9411,21 +10504,8 @@
                   <a:srgbClr val="000000"/>
                 </a:solidFill>
               </a:rPr>
-              <a:t> = </a:t>
-            </a:r>
-            <a:r>
-              <a:rPr lang="en-US" sz="3600" b="1" dirty="0" smtClean="0">
-                <a:solidFill>
-                  <a:srgbClr val="000000"/>
-                </a:solidFill>
-              </a:rPr>
-              <a:t>-1,</a:t>
-            </a:r>
-            <a:endParaRPr lang="en-US" sz="3600" b="1" dirty="0" smtClean="0">
-              <a:solidFill>
-                <a:srgbClr val="000000"/>
-              </a:solidFill>
-            </a:endParaRPr>
+              <a:t> = -1,</a:t>
+            </a:r>
           </a:p>
           <a:p>
             <a:pPr algn="ctr"/>
@@ -10711,21 +11791,8 @@
                   <a:srgbClr val="000000"/>
                 </a:solidFill>
               </a:rPr>
-              <a:t> = </a:t>
-            </a:r>
-            <a:r>
-              <a:rPr lang="en-US" sz="3600" b="1" dirty="0" smtClean="0">
-                <a:solidFill>
-                  <a:srgbClr val="000000"/>
-                </a:solidFill>
-              </a:rPr>
-              <a:t>1,</a:t>
-            </a:r>
-            <a:endParaRPr lang="en-US" sz="3600" b="1" dirty="0" smtClean="0">
-              <a:solidFill>
-                <a:srgbClr val="000000"/>
-              </a:solidFill>
-            </a:endParaRPr>
+              <a:t> = 1,</a:t>
+            </a:r>
           </a:p>
           <a:p>
             <a:pPr algn="ctr"/>
@@ -10791,21 +11858,8 @@
                   <a:srgbClr val="000000"/>
                 </a:solidFill>
               </a:rPr>
-              <a:t> = </a:t>
-            </a:r>
-            <a:r>
-              <a:rPr lang="en-US" sz="3600" b="1" dirty="0" smtClean="0">
-                <a:solidFill>
-                  <a:srgbClr val="000000"/>
-                </a:solidFill>
-              </a:rPr>
-              <a:t>-1,</a:t>
-            </a:r>
-            <a:endParaRPr lang="en-US" sz="3600" b="1" dirty="0" smtClean="0">
-              <a:solidFill>
-                <a:srgbClr val="000000"/>
-              </a:solidFill>
-            </a:endParaRPr>
+              <a:t> = -1,</a:t>
+            </a:r>
           </a:p>
           <a:p>
             <a:pPr algn="ctr"/>
@@ -11719,21 +12773,8 @@
                   <a:srgbClr val="000000"/>
                 </a:solidFill>
               </a:rPr>
-              <a:t> = </a:t>
-            </a:r>
-            <a:r>
-              <a:rPr lang="en-US" sz="3600" b="1" dirty="0" smtClean="0">
-                <a:solidFill>
-                  <a:srgbClr val="000000"/>
-                </a:solidFill>
-              </a:rPr>
-              <a:t>1,</a:t>
-            </a:r>
-            <a:endParaRPr lang="en-US" sz="3600" b="1" dirty="0" smtClean="0">
-              <a:solidFill>
-                <a:srgbClr val="000000"/>
-              </a:solidFill>
-            </a:endParaRPr>
+              <a:t> = 1,</a:t>
+            </a:r>
           </a:p>
           <a:p>
             <a:pPr algn="ctr"/>
@@ -11799,21 +12840,8 @@
                   <a:srgbClr val="000000"/>
                 </a:solidFill>
               </a:rPr>
-              <a:t> = </a:t>
-            </a:r>
-            <a:r>
-              <a:rPr lang="en-US" sz="3600" b="1" dirty="0" smtClean="0">
-                <a:solidFill>
-                  <a:srgbClr val="000000"/>
-                </a:solidFill>
-              </a:rPr>
-              <a:t>-1,</a:t>
-            </a:r>
-            <a:endParaRPr lang="en-US" sz="3600" b="1" dirty="0" smtClean="0">
-              <a:solidFill>
-                <a:srgbClr val="000000"/>
-              </a:solidFill>
-            </a:endParaRPr>
+              <a:t> = -1,</a:t>
+            </a:r>
           </a:p>
           <a:p>
             <a:pPr algn="ctr"/>
@@ -12752,21 +13780,8 @@
                   <a:srgbClr val="000000"/>
                 </a:solidFill>
               </a:rPr>
-              <a:t> = </a:t>
-            </a:r>
-            <a:r>
-              <a:rPr lang="en-US" sz="3600" b="1" dirty="0" smtClean="0">
-                <a:solidFill>
-                  <a:srgbClr val="000000"/>
-                </a:solidFill>
-              </a:rPr>
-              <a:t>-1</a:t>
-            </a:r>
-            <a:endParaRPr lang="en-US" sz="3600" b="1" dirty="0" smtClean="0">
-              <a:solidFill>
-                <a:srgbClr val="000000"/>
-              </a:solidFill>
-            </a:endParaRPr>
+              <a:t> = -1</a:t>
+            </a:r>
           </a:p>
           <a:p>
             <a:pPr algn="ctr"/>
@@ -13425,11 +14440,7 @@
             </a:r>
             <a:r>
               <a:rPr lang="en-US" sz="4400" b="1" dirty="0" smtClean="0"/>
-              <a:t>= </a:t>
-            </a:r>
-            <a:r>
-              <a:rPr lang="en-US" sz="4400" b="1" dirty="0" smtClean="0"/>
-              <a:t>3</a:t>
+              <a:t>= 3</a:t>
             </a:r>
             <a:endParaRPr lang="en-US" sz="4400" b="1" baseline="-25000" dirty="0"/>
           </a:p>
@@ -13687,21 +14698,8 @@
                   <a:srgbClr val="000000"/>
                 </a:solidFill>
               </a:rPr>
-              <a:t> = </a:t>
-            </a:r>
-            <a:r>
-              <a:rPr lang="en-US" sz="3600" b="1" dirty="0" smtClean="0">
-                <a:solidFill>
-                  <a:srgbClr val="000000"/>
-                </a:solidFill>
-              </a:rPr>
-              <a:t>-1</a:t>
-            </a:r>
-            <a:endParaRPr lang="en-US" sz="3600" b="1" dirty="0" smtClean="0">
-              <a:solidFill>
-                <a:srgbClr val="000000"/>
-              </a:solidFill>
-            </a:endParaRPr>
+              <a:t> = -1</a:t>
+            </a:r>
           </a:p>
           <a:p>
             <a:pPr algn="ctr"/>
@@ -14360,11 +15358,7 @@
             </a:r>
             <a:r>
               <a:rPr lang="en-US" sz="4400" b="1" dirty="0" smtClean="0"/>
-              <a:t>= </a:t>
-            </a:r>
-            <a:r>
-              <a:rPr lang="en-US" sz="4400" b="1" dirty="0" smtClean="0"/>
-              <a:t>3</a:t>
+              <a:t>= 3</a:t>
             </a:r>
             <a:endParaRPr lang="en-US" sz="4400" b="1" baseline="-25000" dirty="0"/>
           </a:p>
@@ -14622,21 +15616,8 @@
                   <a:srgbClr val="000000"/>
                 </a:solidFill>
               </a:rPr>
-              <a:t> = </a:t>
-            </a:r>
-            <a:r>
-              <a:rPr lang="en-US" sz="3600" b="1" dirty="0" smtClean="0">
-                <a:solidFill>
-                  <a:srgbClr val="000000"/>
-                </a:solidFill>
-              </a:rPr>
-              <a:t>-1</a:t>
-            </a:r>
-            <a:endParaRPr lang="en-US" sz="3600" b="1" dirty="0" smtClean="0">
-              <a:solidFill>
-                <a:srgbClr val="000000"/>
-              </a:solidFill>
-            </a:endParaRPr>
+              <a:t> = -1</a:t>
+            </a:r>
           </a:p>
           <a:p>
             <a:pPr algn="ctr"/>
@@ -15202,13 +16183,8 @@
             </a:r>
             <a:r>
               <a:rPr lang="en-US" sz="3600" b="1" dirty="0" smtClean="0"/>
-              <a:t> = </a:t>
-            </a:r>
-            <a:r>
-              <a:rPr lang="en-US" sz="3600" b="1" dirty="0" smtClean="0"/>
-              <a:t>3</a:t>
-            </a:r>
-            <a:endParaRPr lang="en-US" sz="3600" b="1" dirty="0" smtClean="0"/>
+              <a:t> = 3</a:t>
+            </a:r>
           </a:p>
           <a:p>
             <a:r>
@@ -15564,4 +16540,324 @@
   </a:objectDefaults>
   <a:extraClrSchemeLst/>
 </a:theme>
+</file>
+
+<file path=ppt/theme/theme2.xml><?xml version="1.0" encoding="utf-8"?>
+<a:theme xmlns:a="http://schemas.openxmlformats.org/drawingml/2006/main" name="Office Theme">
+  <a:themeElements>
+    <a:clrScheme name="Office">
+      <a:dk1>
+        <a:sysClr val="windowText" lastClr="000000"/>
+      </a:dk1>
+      <a:lt1>
+        <a:sysClr val="window" lastClr="FFFFFF"/>
+      </a:lt1>
+      <a:dk2>
+        <a:srgbClr val="1F497D"/>
+      </a:dk2>
+      <a:lt2>
+        <a:srgbClr val="EEECE1"/>
+      </a:lt2>
+      <a:accent1>
+        <a:srgbClr val="4F81BD"/>
+      </a:accent1>
+      <a:accent2>
+        <a:srgbClr val="C0504D"/>
+      </a:accent2>
+      <a:accent3>
+        <a:srgbClr val="9BBB59"/>
+      </a:accent3>
+      <a:accent4>
+        <a:srgbClr val="8064A2"/>
+      </a:accent4>
+      <a:accent5>
+        <a:srgbClr val="4BACC6"/>
+      </a:accent5>
+      <a:accent6>
+        <a:srgbClr val="F79646"/>
+      </a:accent6>
+      <a:hlink>
+        <a:srgbClr val="0000FF"/>
+      </a:hlink>
+      <a:folHlink>
+        <a:srgbClr val="800080"/>
+      </a:folHlink>
+    </a:clrScheme>
+    <a:fontScheme name="Office">
+      <a:majorFont>
+        <a:latin typeface="Calibri"/>
+        <a:ea typeface=""/>
+        <a:cs typeface=""/>
+        <a:font script="Jpan" typeface="ＭＳ Ｐゴシック"/>
+        <a:font script="Hang" typeface="맑은 고딕"/>
+        <a:font script="Hans" typeface="宋体"/>
+        <a:font script="Hant" typeface="新細明體"/>
+        <a:font script="Arab" typeface="Times New Roman"/>
+        <a:font script="Hebr" typeface="Times New Roman"/>
+        <a:font script="Thai" typeface="Angsana New"/>
+        <a:font script="Ethi" typeface="Nyala"/>
+        <a:font script="Beng" typeface="Vrinda"/>
+        <a:font script="Gujr" typeface="Shruti"/>
+        <a:font script="Khmr" typeface="MoolBoran"/>
+        <a:font script="Knda" typeface="Tunga"/>
+        <a:font script="Guru" typeface="Raavi"/>
+        <a:font script="Cans" typeface="Euphemia"/>
+        <a:font script="Cher" typeface="Plantagenet Cherokee"/>
+        <a:font script="Yiii" typeface="Microsoft Yi Baiti"/>
+        <a:font script="Tibt" typeface="Microsoft Himalaya"/>
+        <a:font script="Thaa" typeface="MV Boli"/>
+        <a:font script="Deva" typeface="Mangal"/>
+        <a:font script="Telu" typeface="Gautami"/>
+        <a:font script="Taml" typeface="Latha"/>
+        <a:font script="Syrc" typeface="Estrangelo Edessa"/>
+        <a:font script="Orya" typeface="Kalinga"/>
+        <a:font script="Mlym" typeface="Kartika"/>
+        <a:font script="Laoo" typeface="DokChampa"/>
+        <a:font script="Sinh" typeface="Iskoola Pota"/>
+        <a:font script="Mong" typeface="Mongolian Baiti"/>
+        <a:font script="Viet" typeface="Times New Roman"/>
+        <a:font script="Uigh" typeface="Microsoft Uighur"/>
+        <a:font script="Geor" typeface="Sylfaen"/>
+      </a:majorFont>
+      <a:minorFont>
+        <a:latin typeface="Calibri"/>
+        <a:ea typeface=""/>
+        <a:cs typeface=""/>
+        <a:font script="Jpan" typeface="ＭＳ Ｐゴシック"/>
+        <a:font script="Hang" typeface="맑은 고딕"/>
+        <a:font script="Hans" typeface="宋体"/>
+        <a:font script="Hant" typeface="新細明體"/>
+        <a:font script="Arab" typeface="Arial"/>
+        <a:font script="Hebr" typeface="Arial"/>
+        <a:font script="Thai" typeface="Cordia New"/>
+        <a:font script="Ethi" typeface="Nyala"/>
+        <a:font script="Beng" typeface="Vrinda"/>
+        <a:font script="Gujr" typeface="Shruti"/>
+        <a:font script="Khmr" typeface="DaunPenh"/>
+        <a:font script="Knda" typeface="Tunga"/>
+        <a:font script="Guru" typeface="Raavi"/>
+        <a:font script="Cans" typeface="Euphemia"/>
+        <a:font script="Cher" typeface="Plantagenet Cherokee"/>
+        <a:font script="Yiii" typeface="Microsoft Yi Baiti"/>
+        <a:font script="Tibt" typeface="Microsoft Himalaya"/>
+        <a:font script="Thaa" typeface="MV Boli"/>
+        <a:font script="Deva" typeface="Mangal"/>
+        <a:font script="Telu" typeface="Gautami"/>
+        <a:font script="Taml" typeface="Latha"/>
+        <a:font script="Syrc" typeface="Estrangelo Edessa"/>
+        <a:font script="Orya" typeface="Kalinga"/>
+        <a:font script="Mlym" typeface="Kartika"/>
+        <a:font script="Laoo" typeface="DokChampa"/>
+        <a:font script="Sinh" typeface="Iskoola Pota"/>
+        <a:font script="Mong" typeface="Mongolian Baiti"/>
+        <a:font script="Viet" typeface="Arial"/>
+        <a:font script="Uigh" typeface="Microsoft Uighur"/>
+        <a:font script="Geor" typeface="Sylfaen"/>
+      </a:minorFont>
+    </a:fontScheme>
+    <a:fmtScheme name="Office">
+      <a:fillStyleLst>
+        <a:solidFill>
+          <a:schemeClr val="phClr"/>
+        </a:solidFill>
+        <a:gradFill rotWithShape="1">
+          <a:gsLst>
+            <a:gs pos="0">
+              <a:schemeClr val="phClr">
+                <a:tint val="50000"/>
+                <a:satMod val="300000"/>
+              </a:schemeClr>
+            </a:gs>
+            <a:gs pos="35000">
+              <a:schemeClr val="phClr">
+                <a:tint val="37000"/>
+                <a:satMod val="300000"/>
+              </a:schemeClr>
+            </a:gs>
+            <a:gs pos="100000">
+              <a:schemeClr val="phClr">
+                <a:tint val="15000"/>
+                <a:satMod val="350000"/>
+              </a:schemeClr>
+            </a:gs>
+          </a:gsLst>
+          <a:lin ang="16200000" scaled="1"/>
+        </a:gradFill>
+        <a:gradFill rotWithShape="1">
+          <a:gsLst>
+            <a:gs pos="0">
+              <a:schemeClr val="phClr">
+                <a:tint val="100000"/>
+                <a:shade val="100000"/>
+                <a:satMod val="130000"/>
+              </a:schemeClr>
+            </a:gs>
+            <a:gs pos="100000">
+              <a:schemeClr val="phClr">
+                <a:tint val="50000"/>
+                <a:shade val="100000"/>
+                <a:satMod val="350000"/>
+              </a:schemeClr>
+            </a:gs>
+          </a:gsLst>
+          <a:lin ang="16200000" scaled="0"/>
+        </a:gradFill>
+      </a:fillStyleLst>
+      <a:lnStyleLst>
+        <a:ln w="9525" cap="flat" cmpd="sng" algn="ctr">
+          <a:solidFill>
+            <a:schemeClr val="phClr">
+              <a:shade val="95000"/>
+              <a:satMod val="105000"/>
+            </a:schemeClr>
+          </a:solidFill>
+          <a:prstDash val="solid"/>
+        </a:ln>
+        <a:ln w="25400" cap="flat" cmpd="sng" algn="ctr">
+          <a:solidFill>
+            <a:schemeClr val="phClr"/>
+          </a:solidFill>
+          <a:prstDash val="solid"/>
+        </a:ln>
+        <a:ln w="38100" cap="flat" cmpd="sng" algn="ctr">
+          <a:solidFill>
+            <a:schemeClr val="phClr"/>
+          </a:solidFill>
+          <a:prstDash val="solid"/>
+        </a:ln>
+      </a:lnStyleLst>
+      <a:effectStyleLst>
+        <a:effectStyle>
+          <a:effectLst>
+            <a:outerShdw blurRad="40000" dist="20000" dir="5400000" rotWithShape="0">
+              <a:srgbClr val="000000">
+                <a:alpha val="38000"/>
+              </a:srgbClr>
+            </a:outerShdw>
+          </a:effectLst>
+        </a:effectStyle>
+        <a:effectStyle>
+          <a:effectLst>
+            <a:outerShdw blurRad="40000" dist="23000" dir="5400000" rotWithShape="0">
+              <a:srgbClr val="000000">
+                <a:alpha val="35000"/>
+              </a:srgbClr>
+            </a:outerShdw>
+          </a:effectLst>
+        </a:effectStyle>
+        <a:effectStyle>
+          <a:effectLst>
+            <a:outerShdw blurRad="40000" dist="23000" dir="5400000" rotWithShape="0">
+              <a:srgbClr val="000000">
+                <a:alpha val="35000"/>
+              </a:srgbClr>
+            </a:outerShdw>
+          </a:effectLst>
+          <a:scene3d>
+            <a:camera prst="orthographicFront">
+              <a:rot lat="0" lon="0" rev="0"/>
+            </a:camera>
+            <a:lightRig rig="threePt" dir="t">
+              <a:rot lat="0" lon="0" rev="1200000"/>
+            </a:lightRig>
+          </a:scene3d>
+          <a:sp3d>
+            <a:bevelT w="63500" h="25400"/>
+          </a:sp3d>
+        </a:effectStyle>
+      </a:effectStyleLst>
+      <a:bgFillStyleLst>
+        <a:solidFill>
+          <a:schemeClr val="phClr"/>
+        </a:solidFill>
+        <a:gradFill rotWithShape="1">
+          <a:gsLst>
+            <a:gs pos="0">
+              <a:schemeClr val="phClr">
+                <a:tint val="40000"/>
+                <a:satMod val="350000"/>
+              </a:schemeClr>
+            </a:gs>
+            <a:gs pos="40000">
+              <a:schemeClr val="phClr">
+                <a:tint val="45000"/>
+                <a:shade val="99000"/>
+                <a:satMod val="350000"/>
+              </a:schemeClr>
+            </a:gs>
+            <a:gs pos="100000">
+              <a:schemeClr val="phClr">
+                <a:shade val="20000"/>
+                <a:satMod val="255000"/>
+              </a:schemeClr>
+            </a:gs>
+          </a:gsLst>
+          <a:path path="circle">
+            <a:fillToRect l="50000" t="-80000" r="50000" b="180000"/>
+          </a:path>
+        </a:gradFill>
+        <a:gradFill rotWithShape="1">
+          <a:gsLst>
+            <a:gs pos="0">
+              <a:schemeClr val="phClr">
+                <a:tint val="80000"/>
+                <a:satMod val="300000"/>
+              </a:schemeClr>
+            </a:gs>
+            <a:gs pos="100000">
+              <a:schemeClr val="phClr">
+                <a:shade val="30000"/>
+                <a:satMod val="200000"/>
+              </a:schemeClr>
+            </a:gs>
+          </a:gsLst>
+          <a:path path="circle">
+            <a:fillToRect l="50000" t="50000" r="50000" b="50000"/>
+          </a:path>
+        </a:gradFill>
+      </a:bgFillStyleLst>
+    </a:fmtScheme>
+  </a:themeElements>
+  <a:objectDefaults>
+    <a:spDef>
+      <a:spPr/>
+      <a:bodyPr/>
+      <a:lstStyle/>
+      <a:style>
+        <a:lnRef idx="1">
+          <a:schemeClr val="accent1"/>
+        </a:lnRef>
+        <a:fillRef idx="3">
+          <a:schemeClr val="accent1"/>
+        </a:fillRef>
+        <a:effectRef idx="2">
+          <a:schemeClr val="accent1"/>
+        </a:effectRef>
+        <a:fontRef idx="minor">
+          <a:schemeClr val="lt1"/>
+        </a:fontRef>
+      </a:style>
+    </a:spDef>
+    <a:lnDef>
+      <a:spPr/>
+      <a:bodyPr/>
+      <a:lstStyle/>
+      <a:style>
+        <a:lnRef idx="2">
+          <a:schemeClr val="accent1"/>
+        </a:lnRef>
+        <a:fillRef idx="0">
+          <a:schemeClr val="accent1"/>
+        </a:fillRef>
+        <a:effectRef idx="1">
+          <a:schemeClr val="accent1"/>
+        </a:effectRef>
+        <a:fontRef idx="minor">
+          <a:schemeClr val="tx1"/>
+        </a:fontRef>
+      </a:style>
+    </a:lnDef>
+  </a:objectDefaults>
+  <a:extraClrSchemeLst/>
+</a:theme>
 </file>
</xml_diff>